<commit_message>
fixed typo in install mongo pres
</commit_message>
<xml_diff>
--- a/tirgul/Install MongoDB.pptx
+++ b/tirgul/Install MongoDB.pptx
@@ -108,6 +108,11 @@
       </a:defRPr>
     </a:lvl9pPr>
   </p:defaultTextStyle>
+  <p:extLst>
+    <p:ext uri="{EFAFB233-063F-42B5-8137-9DF3F51BA10A}">
+      <p15:sldGuideLst xmlns:p15="http://schemas.microsoft.com/office/powerpoint/2012/main"/>
+    </p:ext>
+  </p:extLst>
 </p:presentation>
 </file>
 
@@ -3020,6 +3025,13 @@
   <p:clrMapOvr>
     <a:masterClrMapping/>
   </p:clrMapOvr>
+  <p:timing>
+    <p:tnLst>
+      <p:par>
+        <p:cTn id="1" dur="indefinite" restart="never" nodeType="tmRoot"/>
+      </p:par>
+    </p:tnLst>
+  </p:timing>
 </p:sld>
 </file>
 
@@ -3095,7 +3107,19 @@
           <a:p>
             <a:r>
               <a:rPr lang="en-US" dirty="0" smtClean="0"/>
-              <a:t>Download “Windows 64bit 2008 R2” file</a:t>
+              <a:t>Download “Windows 64bit </a:t>
+            </a:r>
+            <a:r>
+              <a:rPr lang="en-US" smtClean="0"/>
+              <a:t>2008 </a:t>
+            </a:r>
+            <a:r>
+              <a:rPr lang="en-US" smtClean="0"/>
+              <a:t>R2+” </a:t>
+            </a:r>
+            <a:r>
+              <a:rPr lang="en-US" dirty="0" smtClean="0"/>
+              <a:t>file</a:t>
             </a:r>
           </a:p>
           <a:p>
@@ -3179,6 +3203,13 @@
   <p:clrMapOvr>
     <a:masterClrMapping/>
   </p:clrMapOvr>
+  <p:timing>
+    <p:tnLst>
+      <p:par>
+        <p:cTn id="1" dur="indefinite" restart="never" nodeType="tmRoot"/>
+      </p:par>
+    </p:tnLst>
+  </p:timing>
 </p:sld>
 </file>
 

</xml_diff>